<commit_message>
ameliorer rapport et slides
</commit_message>
<xml_diff>
--- a/docs/slides/presentation.pptx
+++ b/docs/slides/presentation.pptx
@@ -17,6 +17,7 @@
     <p:sldId id="265" r:id="rId11"/>
     <p:sldId id="266" r:id="rId12"/>
     <p:sldId id="267" r:id="rId13"/>
+    <p:sldId id="268" r:id="rId14"/>
   </p:sldIdLst>
   <p:sldSz cx="9144000" cy="5143500" type="screen16x9"/>
   <p:notesSz cx="6858000" cy="9144000"/>
@@ -3154,8 +3155,16 @@
             <a:pPr lvl="0" indent="0" marL="0">
               <a:buNone/>
             </a:pPr>
+            <a:r>
+              <a:rPr/>
+              <a:t>Analyse descriptive de l’offre</a:t>
+            </a:r>
             <a:br/>
             <a:br/>
+            <a:r>
+              <a:rPr/>
+              <a:t>Ahmed Oumarou</a:t>
+            </a:r>
           </a:p>
         </p:txBody>
       </p:sp>
@@ -3201,7 +3210,7 @@
             </a:pPr>
             <a:r>
               <a:rPr/>
-              <a:t>Recommandations</a:t>
+              <a:t>Interpretation</a:t>
             </a:r>
           </a:p>
         </p:txBody>
@@ -3224,21 +3233,21 @@
             <a:pPr lvl="0"/>
             <a:r>
               <a:rPr/>
-              <a:t>Renforcer les lignes les plus sollicitees</a:t>
-            </a:r>
-          </a:p>
-          <a:p>
-            <a:pPr lvl="0"/>
-            <a:r>
-              <a:rPr/>
-              <a:t>Ajuster la frequence aux heures de pointe</a:t>
-            </a:r>
-          </a:p>
-          <a:p>
-            <a:pPr lvl="0"/>
-            <a:r>
-              <a:rPr/>
-              <a:t>Ameliorer la qualite des donnees horaires</a:t>
+              <a:t>Offre concentree sur peu de lignes</a:t>
+            </a:r>
+          </a:p>
+          <a:p>
+            <a:pPr lvl="0"/>
+            <a:r>
+              <a:rPr/>
+              <a:t>Forte heterogeneite entre lignes</a:t>
+            </a:r>
+          </a:p>
+          <a:p>
+            <a:pPr lvl="0"/>
+            <a:r>
+              <a:rPr/>
+              <a:t>Pics horaires clairs matin/soir</a:t>
             </a:r>
           </a:p>
         </p:txBody>
@@ -3285,7 +3294,7 @@
             </a:pPr>
             <a:r>
               <a:rPr/>
-              <a:t>Conclusion</a:t>
+              <a:t>Recommandations</a:t>
             </a:r>
           </a:p>
         </p:txBody>
@@ -3308,14 +3317,21 @@
             <a:pPr lvl="0"/>
             <a:r>
               <a:rPr/>
-              <a:t>Objectifs atteints</a:t>
-            </a:r>
-          </a:p>
-          <a:p>
-            <a:pPr lvl="0"/>
-            <a:r>
-              <a:rPr/>
-              <a:t>Analyse exploitable pour decision transport</a:t>
+              <a:t>Renforcer les lignes les plus sollicitees</a:t>
+            </a:r>
+          </a:p>
+          <a:p>
+            <a:pPr lvl="0"/>
+            <a:r>
+              <a:rPr/>
+              <a:t>Ajuster la frequence en heures de pointe</a:t>
+            </a:r>
+          </a:p>
+          <a:p>
+            <a:pPr lvl="0"/>
+            <a:r>
+              <a:rPr/>
+              <a:t>Ameliorer la qualite des donnees horaires</a:t>
             </a:r>
           </a:p>
         </p:txBody>
@@ -3362,6 +3378,83 @@
             </a:pPr>
             <a:r>
               <a:rPr/>
+              <a:t>Conclusion</a:t>
+            </a:r>
+          </a:p>
+        </p:txBody>
+      </p:sp>
+      <p:sp>
+        <p:nvSpPr>
+          <p:cNvPr id="3" name="Content Placeholder 2"/>
+          <p:cNvSpPr>
+            <a:spLocks noGrp="1"/>
+          </p:cNvSpPr>
+          <p:nvPr>
+            <p:ph idx="1"/>
+          </p:nvPr>
+        </p:nvSpPr>
+        <p:spPr/>
+        <p:txBody>
+          <a:bodyPr/>
+          <a:lstStyle/>
+          <a:p>
+            <a:pPr lvl="0"/>
+            <a:r>
+              <a:rPr/>
+              <a:t>Objectifs atteints</a:t>
+            </a:r>
+          </a:p>
+          <a:p>
+            <a:pPr lvl="0"/>
+            <a:r>
+              <a:rPr/>
+              <a:t>Analyse exploitable pour decision transport</a:t>
+            </a:r>
+          </a:p>
+        </p:txBody>
+      </p:sp>
+    </p:spTree>
+  </p:cSld>
+</p:sld>
+</file>
+
+<file path=ppt/slides/slide13.xml><?xml version="1.0" encoding="utf-8"?>
+<p:sld xmlns:a="http://schemas.openxmlformats.org/drawingml/2006/main" xmlns:r="http://schemas.openxmlformats.org/officeDocument/2006/relationships" xmlns:p="http://schemas.openxmlformats.org/presentationml/2006/main">
+  <p:cSld>
+    <p:spTree>
+      <p:nvGrpSpPr>
+        <p:cNvPr id="1" name=""/>
+        <p:cNvGrpSpPr/>
+        <p:nvPr/>
+      </p:nvGrpSpPr>
+      <p:grpSpPr>
+        <a:xfrm>
+          <a:off x="0" y="0"/>
+          <a:ext cx="0" cy="0"/>
+          <a:chOff x="0" y="0"/>
+          <a:chExt cx="0" cy="0"/>
+        </a:xfrm>
+      </p:grpSpPr>
+      <p:sp>
+        <p:nvSpPr>
+          <p:cNvPr id="2" name="Title 1"/>
+          <p:cNvSpPr>
+            <a:spLocks noGrp="1"/>
+          </p:cNvSpPr>
+          <p:nvPr>
+            <p:ph type="title"/>
+          </p:nvPr>
+        </p:nvSpPr>
+        <p:spPr/>
+        <p:txBody>
+          <a:bodyPr/>
+          <a:lstStyle/>
+          <a:p>
+            <a:pPr lvl="0" indent="0" marL="0">
+              <a:buNone/>
+            </a:pPr>
+            <a:r>
+              <a:rPr/>
               <a:t>Merci</a:t>
             </a:r>
           </a:p>
@@ -3602,7 +3695,7 @@
             </a:pPr>
             <a:r>
               <a:rPr/>
-              <a:t>Methodologie</a:t>
+              <a:t>Donnees</a:t>
             </a:r>
           </a:p>
         </p:txBody>
@@ -3625,28 +3718,21 @@
             <a:pPr lvl="0"/>
             <a:r>
               <a:rPr/>
-              <a:t>Lecture GTFS (UTF-16)</a:t>
-            </a:r>
-          </a:p>
-          <a:p>
-            <a:pPr lvl="0"/>
-            <a:r>
-              <a:rPr/>
-              <a:t>Nettoyage des heures (HH:MM)</a:t>
-            </a:r>
-          </a:p>
-          <a:p>
-            <a:pPr lvl="0"/>
-            <a:r>
-              <a:rPr/>
-              <a:t>Indicateurs: lignes, arrets, trajets, amplitude</a:t>
-            </a:r>
-          </a:p>
-          <a:p>
-            <a:pPr lvl="0"/>
-            <a:r>
-              <a:rPr/>
-              <a:t>Agregations par ligne et par heure</a:t>
+              <a:t>Sources: fichiers GTFS officiels</a:t>
+            </a:r>
+          </a:p>
+          <a:p>
+            <a:pPr lvl="0"/>
+            <a:r>
+              <a:rPr/>
+              <a:t>Champs cles: lignes, arrets, trajets, horaires</a:t>
+            </a:r>
+          </a:p>
+          <a:p>
+            <a:pPr lvl="0"/>
+            <a:r>
+              <a:rPr/>
+              <a:t>Perimetre: offre de transport (sans demande voyageurs)</a:t>
             </a:r>
           </a:p>
         </p:txBody>
@@ -3693,7 +3779,7 @@
             </a:pPr>
             <a:r>
               <a:rPr/>
-              <a:t>Indicateurs globaux</a:t>
+              <a:t>Methodologie</a:t>
             </a:r>
           </a:p>
         </p:txBody>
@@ -3716,28 +3802,28 @@
             <a:pPr lvl="0"/>
             <a:r>
               <a:rPr/>
-              <a:t>Nombre total de lignes</a:t>
-            </a:r>
-          </a:p>
-          <a:p>
-            <a:pPr lvl="0"/>
-            <a:r>
-              <a:rPr/>
-              <a:t>Nombre total d’arrets</a:t>
-            </a:r>
-          </a:p>
-          <a:p>
-            <a:pPr lvl="0"/>
-            <a:r>
-              <a:rPr/>
-              <a:t>Nombre total de trajets</a:t>
-            </a:r>
-          </a:p>
-          <a:p>
-            <a:pPr lvl="0"/>
-            <a:r>
-              <a:rPr/>
-              <a:t>Amplitude horaire du service</a:t>
+              <a:t>Lecture GTFS (UTF-16)</a:t>
+            </a:r>
+          </a:p>
+          <a:p>
+            <a:pPr lvl="0"/>
+            <a:r>
+              <a:rPr/>
+              <a:t>Nettoyage des heures (HH:MM)</a:t>
+            </a:r>
+          </a:p>
+          <a:p>
+            <a:pPr lvl="0"/>
+            <a:r>
+              <a:rPr/>
+              <a:t>Indicateurs: lignes, arrets, trajets, amplitude</a:t>
+            </a:r>
+          </a:p>
+          <a:p>
+            <a:pPr lvl="0"/>
+            <a:r>
+              <a:rPr/>
+              <a:t>Agregations par ligne et par heure</a:t>
             </a:r>
           </a:p>
         </p:txBody>
@@ -3784,7 +3870,7 @@
             </a:pPr>
             <a:r>
               <a:rPr/>
-              <a:t>Repartition par ligne</a:t>
+              <a:t>Indicateurs globaux</a:t>
             </a:r>
           </a:p>
         </p:txBody>
@@ -3807,21 +3893,28 @@
             <a:pPr lvl="0"/>
             <a:r>
               <a:rPr/>
-              <a:t>Top 10 lignes par nombre de trajets</a:t>
-            </a:r>
-          </a:p>
-          <a:p>
-            <a:pPr lvl="0"/>
-            <a:r>
-              <a:rPr/>
-              <a:t>Part des trajets par ligne</a:t>
-            </a:r>
-          </a:p>
-          <a:p>
-            <a:pPr lvl="0"/>
-            <a:r>
-              <a:rPr/>
-              <a:t>Frequence moyenne par heure</a:t>
+              <a:t>Nombre total de lignes</a:t>
+            </a:r>
+          </a:p>
+          <a:p>
+            <a:pPr lvl="0"/>
+            <a:r>
+              <a:rPr/>
+              <a:t>Nombre total d’arrets</a:t>
+            </a:r>
+          </a:p>
+          <a:p>
+            <a:pPr lvl="0"/>
+            <a:r>
+              <a:rPr/>
+              <a:t>Nombre total de trajets</a:t>
+            </a:r>
+          </a:p>
+          <a:p>
+            <a:pPr lvl="0"/>
+            <a:r>
+              <a:rPr/>
+              <a:t>Amplitude horaire du service</a:t>
             </a:r>
           </a:p>
         </p:txBody>
@@ -3868,7 +3961,7 @@
             </a:pPr>
             <a:r>
               <a:rPr/>
-              <a:t>Heures de pointe</a:t>
+              <a:t>Repartition par ligne</a:t>
             </a:r>
           </a:p>
         </p:txBody>
@@ -3891,21 +3984,21 @@
             <a:pPr lvl="0"/>
             <a:r>
               <a:rPr/>
-              <a:t>Analyse matin (06-09)</a:t>
-            </a:r>
-          </a:p>
-          <a:p>
-            <a:pPr lvl="0"/>
-            <a:r>
-              <a:rPr/>
-              <a:t>Analyse soir (16-19)</a:t>
-            </a:r>
-          </a:p>
-          <a:p>
-            <a:pPr lvl="0"/>
-            <a:r>
-              <a:rPr/>
-              <a:t>Heure la plus chargee</a:t>
+              <a:t>Top 10 lignes par nombre de trajets</a:t>
+            </a:r>
+          </a:p>
+          <a:p>
+            <a:pPr lvl="0"/>
+            <a:r>
+              <a:rPr/>
+              <a:t>Part des trajets par ligne</a:t>
+            </a:r>
+          </a:p>
+          <a:p>
+            <a:pPr lvl="0"/>
+            <a:r>
+              <a:rPr/>
+              <a:t>Frequence moyenne par heure</a:t>
             </a:r>
           </a:p>
         </p:txBody>
@@ -3952,7 +4045,7 @@
             </a:pPr>
             <a:r>
               <a:rPr/>
-              <a:t>Visualisations</a:t>
+              <a:t>Heures de pointe</a:t>
             </a:r>
           </a:p>
         </p:txBody>
@@ -3975,28 +4068,21 @@
             <a:pPr lvl="0"/>
             <a:r>
               <a:rPr/>
-              <a:t>Histogrammes (arrets, trajets)</a:t>
-            </a:r>
-          </a:p>
-          <a:p>
-            <a:pPr lvl="0"/>
-            <a:r>
-              <a:rPr/>
-              <a:t>Boxplot des trajets par ligne</a:t>
-            </a:r>
-          </a:p>
-          <a:p>
-            <a:pPr lvl="0"/>
-            <a:r>
-              <a:rPr/>
-              <a:t>Repartition horaire des departs</a:t>
-            </a:r>
-          </a:p>
-          <a:p>
-            <a:pPr lvl="0"/>
-            <a:r>
-              <a:rPr/>
-              <a:t>Top 10 lignes (trajets et part)</a:t>
+              <a:t>Matin: 06h-09h</a:t>
+            </a:r>
+          </a:p>
+          <a:p>
+            <a:pPr lvl="0"/>
+            <a:r>
+              <a:rPr/>
+              <a:t>Soir: 16h-19h</a:t>
+            </a:r>
+          </a:p>
+          <a:p>
+            <a:pPr lvl="0"/>
+            <a:r>
+              <a:rPr/>
+              <a:t>Heure la plus chargee</a:t>
             </a:r>
           </a:p>
         </p:txBody>
@@ -4043,7 +4129,7 @@
             </a:pPr>
             <a:r>
               <a:rPr/>
-              <a:t>Interpretation</a:t>
+              <a:t>Visualisations</a:t>
             </a:r>
           </a:p>
         </p:txBody>
@@ -4066,21 +4152,28 @@
             <a:pPr lvl="0"/>
             <a:r>
               <a:rPr/>
-              <a:t>Offre concentree sur peu de lignes</a:t>
-            </a:r>
-          </a:p>
-          <a:p>
-            <a:pPr lvl="0"/>
-            <a:r>
-              <a:rPr/>
-              <a:t>Forte heterogeneite entre lignes</a:t>
-            </a:r>
-          </a:p>
-          <a:p>
-            <a:pPr lvl="0"/>
-            <a:r>
-              <a:rPr/>
-              <a:t>Pics horaires clairs matin/soir</a:t>
+              <a:t>Histogrammes (arrets, trajets)</a:t>
+            </a:r>
+          </a:p>
+          <a:p>
+            <a:pPr lvl="0"/>
+            <a:r>
+              <a:rPr/>
+              <a:t>Boxplot des trajets par ligne</a:t>
+            </a:r>
+          </a:p>
+          <a:p>
+            <a:pPr lvl="0"/>
+            <a:r>
+              <a:rPr/>
+              <a:t>Repartition horaire des departs</a:t>
+            </a:r>
+          </a:p>
+          <a:p>
+            <a:pPr lvl="0"/>
+            <a:r>
+              <a:rPr/>
+              <a:t>Top 10 lignes (trajets et part)</a:t>
             </a:r>
           </a:p>
         </p:txBody>

</xml_diff>